<commit_message>
UPDATE review AND board file system
</commit_message>
<xml_diff>
--- a/BeforeStart/아이디어톤.pptx
+++ b/BeforeStart/아이디어톤.pptx
@@ -214,7 +214,7 @@
           <a:p>
             <a:fld id="{9DD72BBB-870D-4CCA-8C14-D97EA00E10F0}" type="datetimeFigureOut">
               <a:rPr lang="ko-KR" altLang="en-US" smtClean="0"/>
-              <a:t>2023-05-15</a:t>
+              <a:t>2023-05-17</a:t>
             </a:fld>
             <a:endParaRPr lang="ko-KR" altLang="en-US"/>
           </a:p>
@@ -13522,14 +13522,14 @@
           <p:nvPr>
             <p:extLst>
               <p:ext uri="{D42A27DB-BD31-4B8C-83A1-F6EECF244321}">
-                <p14:modId xmlns:p14="http://schemas.microsoft.com/office/powerpoint/2010/main" val="1374469276"/>
+                <p14:modId xmlns:p14="http://schemas.microsoft.com/office/powerpoint/2010/main" val="1682073815"/>
               </p:ext>
             </p:extLst>
           </p:nvPr>
         </p:nvGraphicFramePr>
         <p:xfrm>
-          <a:off x="1478004" y="822122"/>
-          <a:ext cx="9148818" cy="6143199"/>
+          <a:off x="885825" y="822122"/>
+          <a:ext cx="9740997" cy="5496212"/>
         </p:xfrm>
         <a:graphic>
           <a:graphicData uri="http://schemas.openxmlformats.org/drawingml/2006/table">
@@ -13538,42 +13538,42 @@
                 <a:tableStyleId>{5C22544A-7EE6-4342-B048-85BDC9FD1C3A}</a:tableStyleId>
               </a:tblPr>
               <a:tblGrid>
-                <a:gridCol w="471046">
+                <a:gridCol w="495300">
                   <a:extLst>
                     <a:ext uri="{9D8B030D-6E8A-4147-A177-3AD203B41FA5}">
                       <a16:colId xmlns:a16="http://schemas.microsoft.com/office/drawing/2014/main" val="3337854217"/>
                     </a:ext>
                   </a:extLst>
                 </a:gridCol>
-                <a:gridCol w="606924">
+                <a:gridCol w="685800">
                   <a:extLst>
                     <a:ext uri="{9D8B030D-6E8A-4147-A177-3AD203B41FA5}">
                       <a16:colId xmlns:a16="http://schemas.microsoft.com/office/drawing/2014/main" val="1863271143"/>
                     </a:ext>
                   </a:extLst>
                 </a:gridCol>
-                <a:gridCol w="2273701">
+                <a:gridCol w="2447925">
                   <a:extLst>
                     <a:ext uri="{9D8B030D-6E8A-4147-A177-3AD203B41FA5}">
                       <a16:colId xmlns:a16="http://schemas.microsoft.com/office/drawing/2014/main" val="2914068450"/>
                     </a:ext>
                   </a:extLst>
                 </a:gridCol>
-                <a:gridCol w="969267">
+                <a:gridCol w="971596">
                   <a:extLst>
                     <a:ext uri="{9D8B030D-6E8A-4147-A177-3AD203B41FA5}">
                       <a16:colId xmlns:a16="http://schemas.microsoft.com/office/drawing/2014/main" val="2811460517"/>
                     </a:ext>
                   </a:extLst>
                 </a:gridCol>
-                <a:gridCol w="969267">
+                <a:gridCol w="1032005">
                   <a:extLst>
                     <a:ext uri="{9D8B030D-6E8A-4147-A177-3AD203B41FA5}">
                       <a16:colId xmlns:a16="http://schemas.microsoft.com/office/drawing/2014/main" val="1033554960"/>
                     </a:ext>
                   </a:extLst>
                 </a:gridCol>
-                <a:gridCol w="3858613">
+                <a:gridCol w="4108371">
                   <a:extLst>
                     <a:ext uri="{9D8B030D-6E8A-4147-A177-3AD203B41FA5}">
                       <a16:colId xmlns:a16="http://schemas.microsoft.com/office/drawing/2014/main" val="646999473"/>
@@ -13790,12 +13790,12 @@
                     <a:p>
                       <a:pPr algn="ctr" fontAlgn="ctr"/>
                       <a:r>
-                        <a:rPr lang="en-US" sz="1000" b="1" u="none" strike="noStrike">
+                        <a:rPr lang="en-US" sz="1000" b="1" u="none" strike="noStrike" dirty="0">
                           <a:effectLst/>
                         </a:rPr>
                         <a:t>Parameter</a:t>
                       </a:r>
-                      <a:endParaRPr lang="en-US" sz="1000" b="1" i="0" u="none" strike="noStrike">
+                      <a:endParaRPr lang="en-US" sz="1000" b="1" i="0" u="none" strike="noStrike" dirty="0">
                         <a:solidFill>
                           <a:srgbClr val="006100"/>
                         </a:solidFill>
@@ -15959,7 +15959,13 @@
                         <a:rPr lang="en-US" sz="1000" u="none" strike="noStrike" dirty="0">
                           <a:effectLst/>
                         </a:rPr>
-                        <a:t>/users/user/{</a:t>
+                        <a:t>/</a:t>
+                      </a:r>
+                      <a:r>
+                        <a:rPr lang="en-US" sz="1000" u="none" strike="noStrike" dirty="0" smtClean="0">
+                          <a:effectLst/>
+                        </a:rPr>
+                        <a:t>user/{</a:t>
                       </a:r>
                       <a:r>
                         <a:rPr lang="en-US" sz="1000" u="none" strike="noStrike" dirty="0" err="1">
@@ -16395,7 +16401,13 @@
                         <a:rPr lang="en-US" sz="1000" u="none" strike="noStrike" dirty="0">
                           <a:effectLst/>
                         </a:rPr>
-                        <a:t>/users/user/{</a:t>
+                        <a:t>/</a:t>
+                      </a:r>
+                      <a:r>
+                        <a:rPr lang="en-US" sz="1000" u="none" strike="noStrike" dirty="0" smtClean="0">
+                          <a:effectLst/>
+                        </a:rPr>
+                        <a:t>user/{</a:t>
                       </a:r>
                       <a:r>
                         <a:rPr lang="en-US" sz="1000" u="none" strike="noStrike" dirty="0" err="1">
@@ -18478,12 +18490,36 @@
                     <a:p>
                       <a:pPr algn="l" fontAlgn="ctr"/>
                       <a:r>
-                        <a:rPr lang="en-US" sz="1000" u="none" strike="noStrike">
+                        <a:rPr lang="en-US" sz="1000" u="none" strike="noStrike" dirty="0">
                           <a:effectLst/>
                         </a:rPr>
-                        <a:t>/mealPlans/meal/{mealName}</a:t>
+                        <a:t>/</a:t>
                       </a:r>
-                      <a:endParaRPr lang="en-US" sz="1000" b="0" i="0" u="none" strike="noStrike">
+                      <a:r>
+                        <a:rPr lang="en-US" sz="1000" u="none" strike="noStrike" dirty="0" err="1">
+                          <a:effectLst/>
+                        </a:rPr>
+                        <a:t>mealPlans</a:t>
+                      </a:r>
+                      <a:r>
+                        <a:rPr lang="en-US" sz="1000" u="none" strike="noStrike" dirty="0">
+                          <a:effectLst/>
+                        </a:rPr>
+                        <a:t>/meal/{</a:t>
+                      </a:r>
+                      <a:r>
+                        <a:rPr lang="en-US" sz="1000" u="none" strike="noStrike" dirty="0" err="1">
+                          <a:effectLst/>
+                        </a:rPr>
+                        <a:t>mealName</a:t>
+                      </a:r>
+                      <a:r>
+                        <a:rPr lang="en-US" sz="1000" u="none" strike="noStrike" dirty="0">
+                          <a:effectLst/>
+                        </a:rPr>
+                        <a:t>}</a:t>
+                      </a:r>
+                      <a:endParaRPr lang="en-US" sz="1000" b="0" i="0" u="none" strike="noStrike" dirty="0">
                         <a:solidFill>
                           <a:srgbClr val="000000"/>
                         </a:solidFill>
@@ -18884,12 +18920,36 @@
                     <a:p>
                       <a:pPr algn="l" fontAlgn="ctr"/>
                       <a:r>
-                        <a:rPr lang="en-US" sz="1000" u="none" strike="noStrike">
+                        <a:rPr lang="en-US" sz="1000" u="none" strike="noStrike" dirty="0">
                           <a:effectLst/>
                         </a:rPr>
-                        <a:t>/mealPlans/user/{userId}/meal/{date}</a:t>
+                        <a:t>/</a:t>
                       </a:r>
-                      <a:endParaRPr lang="en-US" sz="1000" b="0" i="0" u="none" strike="noStrike">
+                      <a:r>
+                        <a:rPr lang="en-US" sz="1000" u="none" strike="noStrike" dirty="0" err="1">
+                          <a:effectLst/>
+                        </a:rPr>
+                        <a:t>mealPlans</a:t>
+                      </a:r>
+                      <a:r>
+                        <a:rPr lang="en-US" sz="1000" u="none" strike="noStrike" dirty="0">
+                          <a:effectLst/>
+                        </a:rPr>
+                        <a:t>/user/{</a:t>
+                      </a:r>
+                      <a:r>
+                        <a:rPr lang="en-US" sz="1000" u="none" strike="noStrike" dirty="0" err="1">
+                          <a:effectLst/>
+                        </a:rPr>
+                        <a:t>userId</a:t>
+                      </a:r>
+                      <a:r>
+                        <a:rPr lang="en-US" sz="1000" u="none" strike="noStrike" dirty="0">
+                          <a:effectLst/>
+                        </a:rPr>
+                        <a:t>}/meal/{date}</a:t>
+                      </a:r>
+                      <a:endParaRPr lang="en-US" sz="1000" b="0" i="0" u="none" strike="noStrike" dirty="0">
                         <a:solidFill>
                           <a:srgbClr val="000000"/>
                         </a:solidFill>
@@ -19322,12 +19382,36 @@
                     <a:p>
                       <a:pPr algn="l" fontAlgn="ctr"/>
                       <a:r>
-                        <a:rPr lang="en-US" sz="1000" u="none" strike="noStrike">
+                        <a:rPr lang="en-US" sz="1000" u="none" strike="noStrike" dirty="0">
                           <a:effectLst/>
                         </a:rPr>
-                        <a:t>/youtube/video/{userId}</a:t>
+                        <a:t>/</a:t>
                       </a:r>
-                      <a:endParaRPr lang="en-US" sz="1000" b="0" i="0" u="none" strike="noStrike">
+                      <a:r>
+                        <a:rPr lang="en-US" sz="1000" u="none" strike="noStrike" dirty="0" err="1">
+                          <a:effectLst/>
+                        </a:rPr>
+                        <a:t>youtube</a:t>
+                      </a:r>
+                      <a:r>
+                        <a:rPr lang="en-US" sz="1000" u="none" strike="noStrike" dirty="0">
+                          <a:effectLst/>
+                        </a:rPr>
+                        <a:t>/video/{</a:t>
+                      </a:r>
+                      <a:r>
+                        <a:rPr lang="en-US" sz="1000" u="none" strike="noStrike" dirty="0" err="1">
+                          <a:effectLst/>
+                        </a:rPr>
+                        <a:t>userId</a:t>
+                      </a:r>
+                      <a:r>
+                        <a:rPr lang="en-US" sz="1000" u="none" strike="noStrike" dirty="0">
+                          <a:effectLst/>
+                        </a:rPr>
+                        <a:t>}</a:t>
+                      </a:r>
+                      <a:endParaRPr lang="en-US" sz="1000" b="0" i="0" u="none" strike="noStrike" dirty="0">
                         <a:solidFill>
                           <a:srgbClr val="000000"/>
                         </a:solidFill>
@@ -19746,12 +19830,24 @@
                     <a:p>
                       <a:pPr algn="l" fontAlgn="ctr"/>
                       <a:r>
-                        <a:rPr lang="en-US" sz="1000" u="none" strike="noStrike">
+                        <a:rPr lang="en-US" sz="1000" u="none" strike="noStrike" dirty="0">
                           <a:effectLst/>
                         </a:rPr>
-                        <a:t>/boards/board/{pagination}</a:t>
+                        <a:t>/</a:t>
                       </a:r>
-                      <a:endParaRPr lang="en-US" sz="1000" b="0" i="0" u="none" strike="noStrike">
+                      <a:r>
+                        <a:rPr lang="en-US" sz="1000" u="none" strike="noStrike" dirty="0" smtClean="0">
+                          <a:effectLst/>
+                        </a:rPr>
+                        <a:t>board/{</a:t>
+                      </a:r>
+                      <a:r>
+                        <a:rPr lang="en-US" sz="1000" u="none" strike="noStrike" dirty="0">
+                          <a:effectLst/>
+                        </a:rPr>
+                        <a:t>pagination}</a:t>
+                      </a:r>
+                      <a:endParaRPr lang="en-US" sz="1000" b="0" i="0" u="none" strike="noStrike" dirty="0">
                         <a:solidFill>
                           <a:srgbClr val="000000"/>
                         </a:solidFill>
@@ -20158,12 +20254,18 @@
                     <a:p>
                       <a:pPr algn="l" fontAlgn="ctr"/>
                       <a:r>
-                        <a:rPr lang="en-US" sz="1000" u="none" strike="noStrike">
+                        <a:rPr lang="en-US" sz="1000" u="none" strike="noStrike" dirty="0">
                           <a:effectLst/>
                         </a:rPr>
-                        <a:t>/boards/board</a:t>
+                        <a:t>/</a:t>
                       </a:r>
-                      <a:endParaRPr lang="en-US" sz="1000" b="0" i="0" u="none" strike="noStrike">
+                      <a:r>
+                        <a:rPr lang="en-US" sz="1000" u="none" strike="noStrike" dirty="0" smtClean="0">
+                          <a:effectLst/>
+                        </a:rPr>
+                        <a:t>board</a:t>
+                      </a:r>
+                      <a:endParaRPr lang="en-US" sz="1000" b="0" i="0" u="none" strike="noStrike" dirty="0">
                         <a:solidFill>
                           <a:srgbClr val="000000"/>
                         </a:solidFill>
@@ -20581,12 +20683,18 @@
                     <a:p>
                       <a:pPr algn="l" fontAlgn="ctr"/>
                       <a:r>
-                        <a:rPr lang="en-US" sz="1000" u="none" strike="noStrike">
+                        <a:rPr lang="en-US" sz="1000" u="none" strike="noStrike" dirty="0">
                           <a:effectLst/>
                         </a:rPr>
-                        <a:t>/boards/board</a:t>
+                        <a:t>/</a:t>
                       </a:r>
-                      <a:endParaRPr lang="en-US" sz="1000" b="0" i="0" u="none" strike="noStrike">
+                      <a:r>
+                        <a:rPr lang="en-US" sz="1000" u="none" strike="noStrike" dirty="0" smtClean="0">
+                          <a:effectLst/>
+                        </a:rPr>
+                        <a:t>board</a:t>
+                      </a:r>
+                      <a:endParaRPr lang="en-US" sz="1000" b="0" i="0" u="none" strike="noStrike" dirty="0">
                         <a:solidFill>
                           <a:srgbClr val="000000"/>
                         </a:solidFill>
@@ -21004,12 +21112,30 @@
                     <a:p>
                       <a:pPr algn="l" fontAlgn="ctr"/>
                       <a:r>
-                        <a:rPr lang="en-US" sz="1000" u="none" strike="noStrike">
+                        <a:rPr lang="en-US" sz="1000" u="none" strike="noStrike" dirty="0">
                           <a:effectLst/>
                         </a:rPr>
-                        <a:t>/boards/board/{boardId}</a:t>
+                        <a:t>/</a:t>
                       </a:r>
-                      <a:endParaRPr lang="en-US" sz="1000" b="0" i="0" u="none" strike="noStrike">
+                      <a:r>
+                        <a:rPr lang="en-US" sz="1000" u="none" strike="noStrike" dirty="0" smtClean="0">
+                          <a:effectLst/>
+                        </a:rPr>
+                        <a:t>board/{</a:t>
+                      </a:r>
+                      <a:r>
+                        <a:rPr lang="en-US" sz="1000" u="none" strike="noStrike" dirty="0" err="1">
+                          <a:effectLst/>
+                        </a:rPr>
+                        <a:t>boardId</a:t>
+                      </a:r>
+                      <a:r>
+                        <a:rPr lang="en-US" sz="1000" u="none" strike="noStrike" dirty="0">
+                          <a:effectLst/>
+                        </a:rPr>
+                        <a:t>}</a:t>
+                      </a:r>
+                      <a:endParaRPr lang="en-US" sz="1000" b="0" i="0" u="none" strike="noStrike" dirty="0">
                         <a:solidFill>
                           <a:srgbClr val="000000"/>
                         </a:solidFill>
@@ -21404,16 +21530,10 @@
                         <a:t>/</a:t>
                       </a:r>
                       <a:r>
-                        <a:rPr lang="en-US" sz="1000" u="none" strike="noStrike" dirty="0" err="1">
+                        <a:rPr lang="en-US" sz="1000" u="none" strike="noStrike" dirty="0" err="1" smtClean="0">
                           <a:effectLst/>
                         </a:rPr>
                         <a:t>likeBoard</a:t>
-                      </a:r>
-                      <a:r>
-                        <a:rPr lang="en-US" sz="1000" u="none" strike="noStrike" dirty="0">
-                          <a:effectLst/>
-                        </a:rPr>
-                        <a:t>/like</a:t>
                       </a:r>
                       <a:endParaRPr lang="en-US" sz="1000" b="0" i="0" u="none" strike="noStrike" dirty="0">
                         <a:solidFill>
@@ -21804,12 +21924,18 @@
                     <a:p>
                       <a:pPr algn="l" fontAlgn="ctr"/>
                       <a:r>
-                        <a:rPr lang="en-US" sz="1000" u="none" strike="noStrike">
+                        <a:rPr lang="en-US" sz="1000" u="none" strike="noStrike" dirty="0">
                           <a:effectLst/>
                         </a:rPr>
-                        <a:t>/likeBoard/like</a:t>
+                        <a:t>/</a:t>
                       </a:r>
-                      <a:endParaRPr lang="en-US" sz="1000" b="0" i="0" u="none" strike="noStrike">
+                      <a:r>
+                        <a:rPr lang="en-US" sz="1000" u="none" strike="noStrike" dirty="0" err="1" smtClean="0">
+                          <a:effectLst/>
+                        </a:rPr>
+                        <a:t>likeBoard</a:t>
+                      </a:r>
+                      <a:endParaRPr lang="en-US" sz="1000" b="0" i="0" u="none" strike="noStrike" dirty="0">
                         <a:solidFill>
                           <a:srgbClr val="000000"/>
                         </a:solidFill>
@@ -22198,12 +22324,30 @@
                     <a:p>
                       <a:pPr algn="l" fontAlgn="ctr"/>
                       <a:r>
-                        <a:rPr lang="en-US" sz="1000" u="none" strike="noStrike">
+                        <a:rPr lang="en-US" sz="1000" u="none" strike="noStrike" dirty="0">
                           <a:effectLst/>
                         </a:rPr>
-                        <a:t>/reviews/review/{boardId}</a:t>
+                        <a:t>/</a:t>
                       </a:r>
-                      <a:endParaRPr lang="en-US" sz="1000" b="0" i="0" u="none" strike="noStrike">
+                      <a:r>
+                        <a:rPr lang="en-US" sz="1000" u="none" strike="noStrike" dirty="0" smtClean="0">
+                          <a:effectLst/>
+                        </a:rPr>
+                        <a:t>review/{</a:t>
+                      </a:r>
+                      <a:r>
+                        <a:rPr lang="en-US" sz="1000" u="none" strike="noStrike" dirty="0" err="1">
+                          <a:effectLst/>
+                        </a:rPr>
+                        <a:t>boardId</a:t>
+                      </a:r>
+                      <a:r>
+                        <a:rPr lang="en-US" sz="1000" u="none" strike="noStrike" dirty="0">
+                          <a:effectLst/>
+                        </a:rPr>
+                        <a:t>}</a:t>
+                      </a:r>
+                      <a:endParaRPr lang="en-US" sz="1000" b="0" i="0" u="none" strike="noStrike" dirty="0">
                         <a:solidFill>
                           <a:srgbClr val="000000"/>
                         </a:solidFill>
@@ -22592,12 +22736,18 @@
                     <a:p>
                       <a:pPr algn="l" fontAlgn="ctr"/>
                       <a:r>
-                        <a:rPr lang="en-US" sz="1000" u="none" strike="noStrike">
+                        <a:rPr lang="en-US" sz="1000" u="none" strike="noStrike" dirty="0">
                           <a:effectLst/>
                         </a:rPr>
-                        <a:t>/reviews/review</a:t>
+                        <a:t>/</a:t>
                       </a:r>
-                      <a:endParaRPr lang="en-US" sz="1000" b="0" i="0" u="none" strike="noStrike">
+                      <a:r>
+                        <a:rPr lang="en-US" sz="1000" u="none" strike="noStrike" dirty="0" smtClean="0">
+                          <a:effectLst/>
+                        </a:rPr>
+                        <a:t>review</a:t>
+                      </a:r>
+                      <a:endParaRPr lang="en-US" sz="1000" b="0" i="0" u="none" strike="noStrike" dirty="0">
                         <a:solidFill>
                           <a:srgbClr val="000000"/>
                         </a:solidFill>
@@ -22986,12 +23136,18 @@
                     <a:p>
                       <a:pPr algn="l" fontAlgn="ctr"/>
                       <a:r>
-                        <a:rPr lang="en-US" sz="1000" u="none" strike="noStrike">
+                        <a:rPr lang="en-US" sz="1000" u="none" strike="noStrike" dirty="0">
                           <a:effectLst/>
                         </a:rPr>
-                        <a:t>/reviews/review</a:t>
+                        <a:t>/</a:t>
                       </a:r>
-                      <a:endParaRPr lang="en-US" sz="1000" b="0" i="0" u="none" strike="noStrike">
+                      <a:r>
+                        <a:rPr lang="en-US" sz="1000" u="none" strike="noStrike" dirty="0" smtClean="0">
+                          <a:effectLst/>
+                        </a:rPr>
+                        <a:t>review</a:t>
+                      </a:r>
+                      <a:endParaRPr lang="en-US" sz="1000" b="0" i="0" u="none" strike="noStrike" dirty="0">
                         <a:solidFill>
                           <a:srgbClr val="000000"/>
                         </a:solidFill>
@@ -23380,12 +23536,30 @@
                     <a:p>
                       <a:pPr algn="l" fontAlgn="ctr"/>
                       <a:r>
-                        <a:rPr lang="en-US" sz="1000" u="none" strike="noStrike">
+                        <a:rPr lang="en-US" sz="1000" u="none" strike="noStrike" dirty="0">
                           <a:effectLst/>
                         </a:rPr>
-                        <a:t>/reviews/review/{reviewId}</a:t>
+                        <a:t>/</a:t>
                       </a:r>
-                      <a:endParaRPr lang="en-US" sz="1000" b="0" i="0" u="none" strike="noStrike">
+                      <a:r>
+                        <a:rPr lang="en-US" sz="1000" u="none" strike="noStrike" dirty="0" smtClean="0">
+                          <a:effectLst/>
+                        </a:rPr>
+                        <a:t>review/{</a:t>
+                      </a:r>
+                      <a:r>
+                        <a:rPr lang="en-US" sz="1000" u="none" strike="noStrike" dirty="0" err="1">
+                          <a:effectLst/>
+                        </a:rPr>
+                        <a:t>reviewId</a:t>
+                      </a:r>
+                      <a:r>
+                        <a:rPr lang="en-US" sz="1000" u="none" strike="noStrike" dirty="0">
+                          <a:effectLst/>
+                        </a:rPr>
+                        <a:t>}</a:t>
+                      </a:r>
+                      <a:endParaRPr lang="en-US" sz="1000" b="0" i="0" u="none" strike="noStrike" dirty="0">
                         <a:solidFill>
                           <a:srgbClr val="000000"/>
                         </a:solidFill>
@@ -27294,7 +27468,7 @@
                 <a16:creationId xmlns:a16="http://schemas.microsoft.com/office/drawing/2014/main" id="{AE192E3E-68A9-4F36-936C-1C8D0B9EF132}"/>
               </a:ext>
               <a:ext uri="{C183D7F6-B498-43B3-948B-1728B52AA6E4}">
-                <adec:decorative xmlns:adec="http://schemas.microsoft.com/office/drawing/2017/decorative" xmlns="" val="1"/>
+                <adec:decorative xmlns="" xmlns:adec="http://schemas.microsoft.com/office/drawing/2017/decorative" val="1"/>
               </a:ext>
             </a:extLst>
           </p:cNvPr>
@@ -27420,7 +27594,7 @@
                 <a16:creationId xmlns:a16="http://schemas.microsoft.com/office/drawing/2014/main" id="{998D6E90-577B-4973-B60A-2700290E68B3}"/>
               </a:ext>
               <a:ext uri="{C183D7F6-B498-43B3-948B-1728B52AA6E4}">
-                <adec:decorative xmlns:adec="http://schemas.microsoft.com/office/drawing/2017/decorative" xmlns="" val="1"/>
+                <adec:decorative xmlns="" xmlns:adec="http://schemas.microsoft.com/office/drawing/2017/decorative" val="1"/>
               </a:ext>
             </a:extLst>
           </p:cNvPr>
@@ -27496,7 +27670,7 @@
                 <a16:creationId xmlns:a16="http://schemas.microsoft.com/office/drawing/2014/main" id="{3FA95682-BEE6-4B33-BA34-7E7BE49782DA}"/>
               </a:ext>
               <a:ext uri="{C183D7F6-B498-43B3-948B-1728B52AA6E4}">
-                <adec:decorative xmlns:adec="http://schemas.microsoft.com/office/drawing/2017/decorative" xmlns="" val="1"/>
+                <adec:decorative xmlns="" xmlns:adec="http://schemas.microsoft.com/office/drawing/2017/decorative" val="1"/>
               </a:ext>
             </a:extLst>
           </p:cNvPr>

</xml_diff>